<commit_message>
updates to architecture figure
</commit_message>
<xml_diff>
--- a/doc/images/wrench-architecture.pptx
+++ b/doc/images/wrench-architecture.pptx
@@ -259,7 +259,7 @@
           <a:p>
             <a:fld id="{3F396E33-74F7-F344-A804-9FE2E160EF69}" type="datetimeFigureOut">
               <a:rPr lang="en-US" smtClean="0"/>
-              <a:t>3/14/22</a:t>
+              <a:t>3/30/22</a:t>
             </a:fld>
             <a:endParaRPr lang="en-US"/>
           </a:p>
@@ -457,7 +457,7 @@
           <a:p>
             <a:fld id="{3F396E33-74F7-F344-A804-9FE2E160EF69}" type="datetimeFigureOut">
               <a:rPr lang="en-US" smtClean="0"/>
-              <a:t>3/14/22</a:t>
+              <a:t>3/30/22</a:t>
             </a:fld>
             <a:endParaRPr lang="en-US"/>
           </a:p>
@@ -665,7 +665,7 @@
           <a:p>
             <a:fld id="{3F396E33-74F7-F344-A804-9FE2E160EF69}" type="datetimeFigureOut">
               <a:rPr lang="en-US" smtClean="0"/>
-              <a:t>3/14/22</a:t>
+              <a:t>3/30/22</a:t>
             </a:fld>
             <a:endParaRPr lang="en-US"/>
           </a:p>
@@ -863,7 +863,7 @@
           <a:p>
             <a:fld id="{3F396E33-74F7-F344-A804-9FE2E160EF69}" type="datetimeFigureOut">
               <a:rPr lang="en-US" smtClean="0"/>
-              <a:t>3/14/22</a:t>
+              <a:t>3/30/22</a:t>
             </a:fld>
             <a:endParaRPr lang="en-US"/>
           </a:p>
@@ -1138,7 +1138,7 @@
           <a:p>
             <a:fld id="{3F396E33-74F7-F344-A804-9FE2E160EF69}" type="datetimeFigureOut">
               <a:rPr lang="en-US" smtClean="0"/>
-              <a:t>3/14/22</a:t>
+              <a:t>3/30/22</a:t>
             </a:fld>
             <a:endParaRPr lang="en-US"/>
           </a:p>
@@ -1403,7 +1403,7 @@
           <a:p>
             <a:fld id="{3F396E33-74F7-F344-A804-9FE2E160EF69}" type="datetimeFigureOut">
               <a:rPr lang="en-US" smtClean="0"/>
-              <a:t>3/14/22</a:t>
+              <a:t>3/30/22</a:t>
             </a:fld>
             <a:endParaRPr lang="en-US"/>
           </a:p>
@@ -1815,7 +1815,7 @@
           <a:p>
             <a:fld id="{3F396E33-74F7-F344-A804-9FE2E160EF69}" type="datetimeFigureOut">
               <a:rPr lang="en-US" smtClean="0"/>
-              <a:t>3/14/22</a:t>
+              <a:t>3/30/22</a:t>
             </a:fld>
             <a:endParaRPr lang="en-US"/>
           </a:p>
@@ -1956,7 +1956,7 @@
           <a:p>
             <a:fld id="{3F396E33-74F7-F344-A804-9FE2E160EF69}" type="datetimeFigureOut">
               <a:rPr lang="en-US" smtClean="0"/>
-              <a:t>3/14/22</a:t>
+              <a:t>3/30/22</a:t>
             </a:fld>
             <a:endParaRPr lang="en-US"/>
           </a:p>
@@ -2069,7 +2069,7 @@
           <a:p>
             <a:fld id="{3F396E33-74F7-F344-A804-9FE2E160EF69}" type="datetimeFigureOut">
               <a:rPr lang="en-US" smtClean="0"/>
-              <a:t>3/14/22</a:t>
+              <a:t>3/30/22</a:t>
             </a:fld>
             <a:endParaRPr lang="en-US"/>
           </a:p>
@@ -2380,7 +2380,7 @@
           <a:p>
             <a:fld id="{3F396E33-74F7-F344-A804-9FE2E160EF69}" type="datetimeFigureOut">
               <a:rPr lang="en-US" smtClean="0"/>
-              <a:t>3/14/22</a:t>
+              <a:t>3/30/22</a:t>
             </a:fld>
             <a:endParaRPr lang="en-US"/>
           </a:p>
@@ -2668,7 +2668,7 @@
           <a:p>
             <a:fld id="{3F396E33-74F7-F344-A804-9FE2E160EF69}" type="datetimeFigureOut">
               <a:rPr lang="en-US" smtClean="0"/>
-              <a:t>3/14/22</a:t>
+              <a:t>3/30/22</a:t>
             </a:fld>
             <a:endParaRPr lang="en-US"/>
           </a:p>
@@ -2909,7 +2909,7 @@
           <a:p>
             <a:fld id="{3F396E33-74F7-F344-A804-9FE2E160EF69}" type="datetimeFigureOut">
               <a:rPr lang="en-US" smtClean="0"/>
-              <a:t>3/14/22</a:t>
+              <a:t>3/30/22</a:t>
             </a:fld>
             <a:endParaRPr lang="en-US"/>
           </a:p>
@@ -3434,7 +3434,7 @@
       </p:sp>
       <p:sp>
         <p:nvSpPr>
-          <p:cNvPr id="6" name="Rectangle 5">
+          <p:cNvPr id="6" name="Round Same Side Corner Rectangle 5">
             <a:extLst>
               <a:ext uri="{FF2B5EF4-FFF2-40B4-BE49-F238E27FC236}">
                 <a16:creationId xmlns:a16="http://schemas.microsoft.com/office/drawing/2014/main" id="{CD874A8E-4D5D-944D-927D-B97DE92FBC6B}"/>
@@ -3445,12 +3445,15 @@
           <p:nvPr/>
         </p:nvSpPr>
         <p:spPr>
-          <a:xfrm>
-            <a:off x="500978" y="401075"/>
-            <a:ext cx="254107" cy="862873"/>
-          </a:xfrm>
-          <a:prstGeom prst="rect">
-            <a:avLst/>
+          <a:xfrm rot="16200000">
+            <a:off x="192844" y="701707"/>
+            <a:ext cx="862874" cy="261610"/>
+          </a:xfrm>
+          <a:prstGeom prst="round2SameRect">
+            <a:avLst>
+              <a:gd name="adj1" fmla="val 16667"/>
+              <a:gd name="adj2" fmla="val 0"/>
+            </a:avLst>
           </a:prstGeom>
           <a:solidFill>
             <a:srgbClr val="ED515A"/>
@@ -3498,8 +3501,8 @@
         </p:nvSpPr>
         <p:spPr>
           <a:xfrm rot="16200000">
-            <a:off x="159617" y="694447"/>
-            <a:ext cx="938077" cy="261610"/>
+            <a:off x="188346" y="709136"/>
+            <a:ext cx="870751" cy="246221"/>
           </a:xfrm>
           <a:prstGeom prst="rect">
             <a:avLst/>
@@ -3514,7 +3517,7 @@
           <a:p>
             <a:pPr algn="ctr"/>
             <a:r>
-              <a:rPr lang="en-US" sz="1100" dirty="0">
+              <a:rPr lang="en-US" sz="1000" dirty="0">
                 <a:solidFill>
                   <a:schemeClr val="bg1"/>
                 </a:solidFill>
@@ -3711,7 +3714,7 @@
       </p:sp>
       <p:sp>
         <p:nvSpPr>
-          <p:cNvPr id="12" name="Rectangle 11">
+          <p:cNvPr id="12" name="Round Same Side Corner Rectangle 11">
             <a:extLst>
               <a:ext uri="{FF2B5EF4-FFF2-40B4-BE49-F238E27FC236}">
                 <a16:creationId xmlns:a16="http://schemas.microsoft.com/office/drawing/2014/main" id="{4E4C5F50-558F-9449-992B-BD6D428A372A}"/>
@@ -3722,11 +3725,11 @@
           <p:nvPr/>
         </p:nvSpPr>
         <p:spPr>
-          <a:xfrm>
-            <a:off x="500978" y="1472461"/>
-            <a:ext cx="254107" cy="1034093"/>
-          </a:xfrm>
-          <a:prstGeom prst="rect">
+          <a:xfrm rot="16200000">
+            <a:off x="124252" y="1864973"/>
+            <a:ext cx="1021551" cy="261611"/>
+          </a:xfrm>
+          <a:prstGeom prst="round2SameRect">
             <a:avLst/>
           </a:prstGeom>
           <a:solidFill>
@@ -3775,8 +3778,8 @@
         </p:nvSpPr>
         <p:spPr>
           <a:xfrm rot="16200000">
-            <a:off x="275836" y="1862628"/>
-            <a:ext cx="705642" cy="261610"/>
+            <a:off x="299881" y="1870322"/>
+            <a:ext cx="657551" cy="246221"/>
           </a:xfrm>
           <a:prstGeom prst="rect">
             <a:avLst/>
@@ -3791,7 +3794,7 @@
           <a:p>
             <a:pPr algn="ctr"/>
             <a:r>
-              <a:rPr lang="en-US" sz="1100" dirty="0">
+              <a:rPr lang="en-US" sz="1000" dirty="0">
                 <a:solidFill>
                   <a:schemeClr val="bg1"/>
                 </a:solidFill>
@@ -4534,7 +4537,7 @@
       </p:sp>
       <p:sp>
         <p:nvSpPr>
-          <p:cNvPr id="36" name="Rectangle 35">
+          <p:cNvPr id="36" name="Round Same Side Corner Rectangle 35">
             <a:extLst>
               <a:ext uri="{FF2B5EF4-FFF2-40B4-BE49-F238E27FC236}">
                 <a16:creationId xmlns:a16="http://schemas.microsoft.com/office/drawing/2014/main" id="{D3E41C72-8EBB-9944-B13A-849F1A781DFA}"/>
@@ -4545,11 +4548,11 @@
           <p:nvPr/>
         </p:nvSpPr>
         <p:spPr>
-          <a:xfrm>
-            <a:off x="511726" y="2733950"/>
-            <a:ext cx="254107" cy="1034093"/>
-          </a:xfrm>
-          <a:prstGeom prst="rect">
+          <a:xfrm rot="16200000">
+            <a:off x="108246" y="3118619"/>
+            <a:ext cx="1030951" cy="261611"/>
+          </a:xfrm>
+          <a:prstGeom prst="round2SameRect">
             <a:avLst/>
           </a:prstGeom>
           <a:solidFill>
@@ -4598,8 +4601,8 @@
         </p:nvSpPr>
         <p:spPr>
           <a:xfrm rot="16200000">
-            <a:off x="95346" y="3120190"/>
-            <a:ext cx="1080745" cy="261610"/>
+            <a:off x="131086" y="3127884"/>
+            <a:ext cx="997388" cy="246221"/>
           </a:xfrm>
           <a:prstGeom prst="rect">
             <a:avLst/>
@@ -4614,7 +4617,7 @@
           <a:p>
             <a:pPr algn="ctr"/>
             <a:r>
-              <a:rPr lang="en-US" sz="1100" dirty="0">
+              <a:rPr lang="en-US" sz="1000" dirty="0">
                 <a:solidFill>
                   <a:schemeClr val="bg1"/>
                 </a:solidFill>
@@ -4696,7 +4699,18 @@
                   </a:schemeClr>
                 </a:solidFill>
               </a:rPr>
-              <a:t>Computation (Cloud, Batch, Rack)</a:t>
+              <a:t>Computation </a:t>
+            </a:r>
+            <a:r>
+              <a:rPr lang="en-US" sz="1100" dirty="0">
+                <a:solidFill>
+                  <a:schemeClr val="tx1">
+                    <a:lumMod val="50000"/>
+                    <a:lumOff val="50000"/>
+                  </a:schemeClr>
+                </a:solidFill>
+              </a:rPr>
+              <a:t>(Cloud, Batch, Rack)</a:t>
             </a:r>
           </a:p>
           <a:p>
@@ -4709,19 +4723,43 @@
                   </a:schemeClr>
                 </a:solidFill>
               </a:rPr>
-              <a:t>Storage (</a:t>
+              <a:t>Storage </a:t>
+            </a:r>
+            <a:r>
+              <a:rPr lang="en-US" sz="1100" dirty="0">
+                <a:solidFill>
+                  <a:schemeClr val="tx1">
+                    <a:lumMod val="50000"/>
+                    <a:lumOff val="50000"/>
+                  </a:schemeClr>
+                </a:solidFill>
+              </a:rPr>
+              <a:t>(</a:t>
             </a:r>
             <a:r>
               <a:rPr lang="en-US" sz="1100" dirty="0" err="1">
                 <a:solidFill>
                   <a:schemeClr val="tx1">
-                    <a:lumMod val="65000"/>
-                    <a:lumOff val="35000"/>
+                    <a:lumMod val="50000"/>
+                    <a:lumOff val="50000"/>
                   </a:schemeClr>
                 </a:solidFill>
               </a:rPr>
               <a:t>XRootD</a:t>
             </a:r>
+            <a:r>
+              <a:rPr lang="en-US" sz="1100" dirty="0">
+                <a:solidFill>
+                  <a:schemeClr val="tx1">
+                    <a:lumMod val="50000"/>
+                    <a:lumOff val="50000"/>
+                  </a:schemeClr>
+                </a:solidFill>
+              </a:rPr>
+              <a:t>, Globus, FTP)</a:t>
+            </a:r>
+          </a:p>
+          <a:p>
             <a:r>
               <a:rPr lang="en-US" sz="1100" dirty="0">
                 <a:solidFill>
@@ -4731,7 +4769,18 @@
                   </a:schemeClr>
                 </a:solidFill>
               </a:rPr>
-              <a:t>, Globus, FTP)</a:t>
+              <a:t>Network Monitoring </a:t>
+            </a:r>
+            <a:r>
+              <a:rPr lang="en-US" sz="1100" dirty="0">
+                <a:solidFill>
+                  <a:schemeClr val="tx1">
+                    <a:lumMod val="50000"/>
+                    <a:lumOff val="50000"/>
+                  </a:schemeClr>
+                </a:solidFill>
+              </a:rPr>
+              <a:t>(Vivaldi)</a:t>
             </a:r>
           </a:p>
           <a:p>
@@ -4744,20 +4793,18 @@
                   </a:schemeClr>
                 </a:solidFill>
               </a:rPr>
-              <a:t>Network Monitoring (Vivaldi)</a:t>
-            </a:r>
-          </a:p>
-          <a:p>
+              <a:t>Data Location </a:t>
+            </a:r>
             <a:r>
               <a:rPr lang="en-US" sz="1100" dirty="0">
                 <a:solidFill>
                   <a:schemeClr val="tx1">
-                    <a:lumMod val="65000"/>
-                    <a:lumOff val="35000"/>
+                    <a:lumMod val="50000"/>
+                    <a:lumOff val="50000"/>
                   </a:schemeClr>
                 </a:solidFill>
               </a:rPr>
-              <a:t>Data Location (Replica Catalog)</a:t>
+              <a:t>(Replica Catalog)</a:t>
             </a:r>
           </a:p>
         </p:txBody>
@@ -5357,7 +5404,7 @@
       </p:sp>
       <p:sp>
         <p:nvSpPr>
-          <p:cNvPr id="60" name="Rectangle 59">
+          <p:cNvPr id="60" name="Round Same Side Corner Rectangle 59">
             <a:extLst>
               <a:ext uri="{FF2B5EF4-FFF2-40B4-BE49-F238E27FC236}">
                 <a16:creationId xmlns:a16="http://schemas.microsoft.com/office/drawing/2014/main" id="{0D41B3BF-D48D-3149-A979-F4C558D65175}"/>
@@ -5368,11 +5415,11 @@
           <p:nvPr/>
         </p:nvSpPr>
         <p:spPr>
-          <a:xfrm>
-            <a:off x="1620951" y="4004455"/>
-            <a:ext cx="254107" cy="611386"/>
-          </a:xfrm>
-          <a:prstGeom prst="rect">
+          <a:xfrm rot="16200000">
+            <a:off x="1207346" y="4187627"/>
+            <a:ext cx="610283" cy="246144"/>
+          </a:xfrm>
+          <a:prstGeom prst="round2SameRect">
             <a:avLst/>
           </a:prstGeom>
           <a:solidFill>
@@ -5468,8 +5515,8 @@
         </p:nvSpPr>
         <p:spPr>
           <a:xfrm rot="16200000">
-            <a:off x="1368435" y="4172514"/>
-            <a:ext cx="754332" cy="261610"/>
+            <a:off x="1136864" y="4180208"/>
+            <a:ext cx="754332" cy="246221"/>
           </a:xfrm>
           <a:prstGeom prst="rect">
             <a:avLst/>
@@ -5484,7 +5531,7 @@
           <a:p>
             <a:pPr algn="ctr"/>
             <a:r>
-              <a:rPr lang="en-US" sz="1100" dirty="0">
+              <a:rPr lang="en-US" sz="1000" dirty="0">
                 <a:solidFill>
                   <a:schemeClr val="bg1"/>
                 </a:solidFill>

</xml_diff>